<commit_message>
Updated power point and added images to deliverables
</commit_message>
<xml_diff>
--- a/deliverables/presentazione eryantis.pptx
+++ b/deliverables/presentazione eryantis.pptx
@@ -5,11 +5,12 @@
     <p:sldMasterId id="2147483648" r:id="rId1"/>
   </p:sldMasterIdLst>
   <p:notesMasterIdLst>
-    <p:notesMasterId r:id="rId4"/>
+    <p:notesMasterId r:id="rId5"/>
   </p:notesMasterIdLst>
   <p:sldIdLst>
     <p:sldId id="257" r:id="rId2"/>
-    <p:sldId id="256" r:id="rId3"/>
+    <p:sldId id="258" r:id="rId3"/>
+    <p:sldId id="256" r:id="rId4"/>
   </p:sldIdLst>
   <p:sldSz cx="12192000" cy="6858000"/>
   <p:notesSz cx="6858000" cy="9144000"/>
@@ -108,6 +109,11 @@
       </a:defRPr>
     </a:lvl9pPr>
   </p:defaultTextStyle>
+  <p:extLst>
+    <p:ext uri="{EFAFB233-063F-42B5-8137-9DF3F51BA10A}">
+      <p15:sldGuideLst xmlns:p15="http://schemas.microsoft.com/office/powerpoint/2012/main"/>
+    </p:ext>
+  </p:extLst>
 </p:presentation>
 </file>
 
@@ -4248,7 +4254,7 @@
       </p:grpSpPr>
       <p:sp useBgFill="1">
         <p:nvSpPr>
-          <p:cNvPr id="16" name="Rectangle 10">
+          <p:cNvPr id="19" name="Rectangle 18">
             <a:extLst>
               <a:ext uri="{FF2B5EF4-FFF2-40B4-BE49-F238E27FC236}">
                 <a16:creationId xmlns:a16="http://schemas.microsoft.com/office/drawing/2014/main" id="{A8384FB5-9ADC-4DDC-881B-597D56F5B15D}"/>
@@ -4324,7 +4330,7 @@
       </p:sp>
       <p:sp>
         <p:nvSpPr>
-          <p:cNvPr id="18" name="Rectangle 12">
+          <p:cNvPr id="21" name="Rectangle 20">
             <a:extLst>
               <a:ext uri="{FF2B5EF4-FFF2-40B4-BE49-F238E27FC236}">
                 <a16:creationId xmlns:a16="http://schemas.microsoft.com/office/drawing/2014/main" id="{1199E1B1-A8C0-4FE8-A5A8-1CB41D69F857}"/>
@@ -4399,7 +4405,7 @@
       </p:sp>
       <p:sp>
         <p:nvSpPr>
-          <p:cNvPr id="15" name="Rectangle 14">
+          <p:cNvPr id="23" name="Rectangle 22">
             <a:extLst>
               <a:ext uri="{FF2B5EF4-FFF2-40B4-BE49-F238E27FC236}">
                 <a16:creationId xmlns:a16="http://schemas.microsoft.com/office/drawing/2014/main" id="{84A8DE83-DE75-4B41-9DB4-A7EC0B0DEC0B}"/>
@@ -4476,7 +4482,7 @@
       </p:sp>
       <p:sp>
         <p:nvSpPr>
-          <p:cNvPr id="17" name="Rectangle 16">
+          <p:cNvPr id="25" name="Rectangle 24">
             <a:extLst>
               <a:ext uri="{FF2B5EF4-FFF2-40B4-BE49-F238E27FC236}">
                 <a16:creationId xmlns:a16="http://schemas.microsoft.com/office/drawing/2014/main" id="{A7009A0A-BEF5-4EAC-AF15-E4F9F002E239}"/>
@@ -4551,6 +4557,570 @@
       </p:sp>
       <p:sp>
         <p:nvSpPr>
+          <p:cNvPr id="2" name="Titolo 1">
+            <a:extLst>
+              <a:ext uri="{FF2B5EF4-FFF2-40B4-BE49-F238E27FC236}">
+                <a16:creationId xmlns:a16="http://schemas.microsoft.com/office/drawing/2014/main" id="{7DECD5F6-2596-C889-BD70-F61311050B3F}"/>
+              </a:ext>
+            </a:extLst>
+          </p:cNvPr>
+          <p:cNvSpPr>
+            <a:spLocks noGrp="1"/>
+          </p:cNvSpPr>
+          <p:nvPr>
+            <p:ph type="title"/>
+          </p:nvPr>
+        </p:nvSpPr>
+        <p:spPr>
+          <a:xfrm>
+            <a:off x="699713" y="248038"/>
+            <a:ext cx="7063721" cy="1159200"/>
+          </a:xfrm>
+        </p:spPr>
+        <p:txBody>
+          <a:bodyPr vert="horz" lIns="91440" tIns="45720" rIns="91440" bIns="45720" rtlCol="0" anchor="ctr">
+            <a:normAutofit/>
+          </a:bodyPr>
+          <a:lstStyle/>
+          <a:p>
+            <a:r>
+              <a:rPr lang="en-US" sz="3700" b="1" kern="1200" dirty="0">
+                <a:solidFill>
+                  <a:srgbClr val="FFFFFF"/>
+                </a:solidFill>
+                <a:latin typeface="+mj-lt"/>
+                <a:ea typeface="+mj-ea"/>
+                <a:cs typeface="+mj-cs"/>
+              </a:rPr>
+              <a:t>MVC pattern</a:t>
+            </a:r>
+          </a:p>
+        </p:txBody>
+      </p:sp>
+      <p:sp>
+        <p:nvSpPr>
+          <p:cNvPr id="6" name="Segnaposto numero diapositiva 5">
+            <a:extLst>
+              <a:ext uri="{FF2B5EF4-FFF2-40B4-BE49-F238E27FC236}">
+                <a16:creationId xmlns:a16="http://schemas.microsoft.com/office/drawing/2014/main" id="{CF3C7E78-562D-B8FE-C89F-A80659CC5C67}"/>
+              </a:ext>
+            </a:extLst>
+          </p:cNvPr>
+          <p:cNvSpPr>
+            <a:spLocks noGrp="1"/>
+          </p:cNvSpPr>
+          <p:nvPr>
+            <p:ph type="sldNum" sz="quarter" idx="12"/>
+          </p:nvPr>
+        </p:nvSpPr>
+        <p:spPr/>
+        <p:txBody>
+          <a:bodyPr/>
+          <a:lstStyle/>
+          <a:p>
+            <a:fld id="{D383B459-ACB3-4989-9D3B-16DC91BBCA19}" type="slidenum">
+              <a:rPr lang="it-IT" sz="1600" smtClean="0">
+                <a:ln w="0"/>
+                <a:solidFill>
+                  <a:schemeClr val="accent1"/>
+                </a:solidFill>
+                <a:effectLst>
+                  <a:outerShdw blurRad="38100" dist="25400" dir="5400000" algn="ctr" rotWithShape="0">
+                    <a:srgbClr val="6E747A">
+                      <a:alpha val="43000"/>
+                    </a:srgbClr>
+                  </a:outerShdw>
+                </a:effectLst>
+              </a:rPr>
+              <a:pPr/>
+              <a:t>2</a:t>
+            </a:fld>
+            <a:endParaRPr lang="it-IT" sz="1600" dirty="0">
+              <a:ln w="0"/>
+              <a:solidFill>
+                <a:schemeClr val="accent1"/>
+              </a:solidFill>
+              <a:effectLst>
+                <a:outerShdw blurRad="38100" dist="25400" dir="5400000" algn="ctr" rotWithShape="0">
+                  <a:srgbClr val="6E747A">
+                    <a:alpha val="43000"/>
+                  </a:srgbClr>
+                </a:outerShdw>
+              </a:effectLst>
+            </a:endParaRPr>
+          </a:p>
+        </p:txBody>
+      </p:sp>
+      <p:pic>
+        <p:nvPicPr>
+          <p:cNvPr id="8" name="Immagine 7">
+            <a:extLst>
+              <a:ext uri="{FF2B5EF4-FFF2-40B4-BE49-F238E27FC236}">
+                <a16:creationId xmlns:a16="http://schemas.microsoft.com/office/drawing/2014/main" id="{163E1374-68D2-8049-0827-E50A65FF5B84}"/>
+              </a:ext>
+            </a:extLst>
+          </p:cNvPr>
+          <p:cNvPicPr>
+            <a:picLocks noChangeAspect="1"/>
+          </p:cNvPicPr>
+          <p:nvPr/>
+        </p:nvPicPr>
+        <p:blipFill>
+          <a:blip r:embed="rId2">
+            <a:extLst>
+              <a:ext uri="{28A0092B-C50C-407E-A947-70E740481C1C}">
+                <a14:useLocalDpi xmlns:a14="http://schemas.microsoft.com/office/drawing/2010/main" val="0"/>
+              </a:ext>
+            </a:extLst>
+          </a:blip>
+          <a:srcRect/>
+          <a:stretch/>
+        </p:blipFill>
+        <p:spPr>
+          <a:xfrm>
+            <a:off x="498996" y="1796989"/>
+            <a:ext cx="11194004" cy="4837179"/>
+          </a:xfrm>
+          <a:prstGeom prst="rect">
+            <a:avLst/>
+          </a:prstGeom>
+        </p:spPr>
+      </p:pic>
+    </p:spTree>
+    <p:extLst>
+      <p:ext uri="{BB962C8B-B14F-4D97-AF65-F5344CB8AC3E}">
+        <p14:creationId xmlns:p14="http://schemas.microsoft.com/office/powerpoint/2010/main" val="1294512817"/>
+      </p:ext>
+    </p:extLst>
+  </p:cSld>
+  <p:clrMapOvr>
+    <a:masterClrMapping/>
+  </p:clrMapOvr>
+  <p:timing>
+    <p:tnLst>
+      <p:par>
+        <p:cTn id="1" dur="indefinite" restart="never" nodeType="tmRoot">
+          <p:childTnLst>
+            <p:seq concurrent="1" nextAc="seek">
+              <p:cTn id="2" dur="indefinite" nodeType="mainSeq">
+                <p:childTnLst>
+                  <p:par>
+                    <p:cTn id="3" fill="hold">
+                      <p:stCondLst>
+                        <p:cond delay="indefinite"/>
+                        <p:cond evt="onBegin" delay="0">
+                          <p:tn val="2"/>
+                        </p:cond>
+                      </p:stCondLst>
+                      <p:childTnLst>
+                        <p:par>
+                          <p:cTn id="4" fill="hold">
+                            <p:stCondLst>
+                              <p:cond delay="0"/>
+                            </p:stCondLst>
+                            <p:childTnLst>
+                              <p:par>
+                                <p:cTn id="5" presetID="10" presetClass="entr" presetSubtype="0" fill="hold" grpId="0" nodeType="withEffect">
+                                  <p:stCondLst>
+                                    <p:cond delay="1000"/>
+                                  </p:stCondLst>
+                                  <p:iterate type="lt">
+                                    <p:tmPct val="10000"/>
+                                  </p:iterate>
+                                  <p:childTnLst>
+                                    <p:set>
+                                      <p:cBhvr>
+                                        <p:cTn id="6" dur="1" fill="hold">
+                                          <p:stCondLst>
+                                            <p:cond delay="0"/>
+                                          </p:stCondLst>
+                                        </p:cTn>
+                                        <p:tgtEl>
+                                          <p:spTgt spid="2"/>
+                                        </p:tgtEl>
+                                        <p:attrNameLst>
+                                          <p:attrName>style.visibility</p:attrName>
+                                        </p:attrNameLst>
+                                      </p:cBhvr>
+                                      <p:to>
+                                        <p:strVal val="visible"/>
+                                      </p:to>
+                                    </p:set>
+                                    <p:animEffect transition="in" filter="fade">
+                                      <p:cBhvr>
+                                        <p:cTn id="7" dur="400"/>
+                                        <p:tgtEl>
+                                          <p:spTgt spid="2"/>
+                                        </p:tgtEl>
+                                      </p:cBhvr>
+                                    </p:animEffect>
+                                  </p:childTnLst>
+                                </p:cTn>
+                              </p:par>
+                            </p:childTnLst>
+                          </p:cTn>
+                        </p:par>
+                      </p:childTnLst>
+                    </p:cTn>
+                  </p:par>
+                </p:childTnLst>
+              </p:cTn>
+              <p:prevCondLst>
+                <p:cond evt="onPrev" delay="0">
+                  <p:tgtEl>
+                    <p:sldTgt/>
+                  </p:tgtEl>
+                </p:cond>
+              </p:prevCondLst>
+              <p:nextCondLst>
+                <p:cond evt="onNext" delay="0">
+                  <p:tgtEl>
+                    <p:sldTgt/>
+                  </p:tgtEl>
+                </p:cond>
+              </p:nextCondLst>
+            </p:seq>
+          </p:childTnLst>
+        </p:cTn>
+      </p:par>
+    </p:tnLst>
+    <p:bldLst>
+      <p:bldP spid="2" grpId="0"/>
+    </p:bldLst>
+  </p:timing>
+</p:sld>
+</file>
+
+<file path=ppt/slides/slide3.xml><?xml version="1.0" encoding="utf-8"?>
+<p:sld xmlns:a="http://schemas.openxmlformats.org/drawingml/2006/main" xmlns:r="http://schemas.openxmlformats.org/officeDocument/2006/relationships" xmlns:p="http://schemas.openxmlformats.org/presentationml/2006/main">
+  <p:cSld>
+    <p:bg>
+      <p:bgPr>
+        <a:solidFill>
+          <a:schemeClr val="bg1"/>
+        </a:solidFill>
+        <a:effectLst/>
+      </p:bgPr>
+    </p:bg>
+    <p:spTree>
+      <p:nvGrpSpPr>
+        <p:cNvPr id="1" name=""/>
+        <p:cNvGrpSpPr/>
+        <p:nvPr/>
+      </p:nvGrpSpPr>
+      <p:grpSpPr>
+        <a:xfrm>
+          <a:off x="0" y="0"/>
+          <a:ext cx="0" cy="0"/>
+          <a:chOff x="0" y="0"/>
+          <a:chExt cx="0" cy="0"/>
+        </a:xfrm>
+      </p:grpSpPr>
+      <p:sp useBgFill="1">
+        <p:nvSpPr>
+          <p:cNvPr id="16" name="Rectangle 10">
+            <a:extLst>
+              <a:ext uri="{FF2B5EF4-FFF2-40B4-BE49-F238E27FC236}">
+                <a16:creationId xmlns:a16="http://schemas.microsoft.com/office/drawing/2014/main" id="{A8384FB5-9ADC-4DDC-881B-597D56F5B15D}"/>
+              </a:ext>
+              <a:ext uri="{C183D7F6-B498-43B3-948B-1728B52AA6E4}">
+                <adec:decorative xmlns:adec="http://schemas.microsoft.com/office/drawing/2017/decorative" val="1"/>
+              </a:ext>
+            </a:extLst>
+          </p:cNvPr>
+          <p:cNvSpPr>
+            <a:spLocks noGrp="1" noRot="1" noChangeAspect="1" noMove="1" noResize="1" noEditPoints="1" noAdjustHandles="1" noChangeArrowheads="1" noChangeShapeType="1" noTextEdit="1"/>
+          </p:cNvSpPr>
+          <p:nvPr>
+            <p:extLst>
+              <p:ext uri="{386F3935-93C4-4BCD-93E2-E3B085C9AB24}">
+                <p16:designElem xmlns:p16="http://schemas.microsoft.com/office/powerpoint/2015/main" val="1"/>
+              </p:ext>
+            </p:extLst>
+          </p:nvPr>
+        </p:nvSpPr>
+        <p:spPr>
+          <a:xfrm>
+            <a:off x="0" y="0"/>
+            <a:ext cx="12192000" cy="6858000"/>
+          </a:xfrm>
+          <a:prstGeom prst="rect">
+            <a:avLst/>
+          </a:prstGeom>
+          <a:ln w="12700" cap="flat" cmpd="sng" algn="ctr">
+            <a:noFill/>
+            <a:prstDash val="solid"/>
+            <a:miter lim="800000"/>
+          </a:ln>
+          <a:effectLst/>
+          <a:extLst>
+            <a:ext uri="{91240B29-F687-4F45-9708-019B960494DF}">
+              <a14:hiddenLine xmlns:a14="http://schemas.microsoft.com/office/drawing/2010/main" w="12700" cap="flat" cmpd="sng" algn="ctr">
+                <a:solidFill>
+                  <a:schemeClr val="accent1">
+                    <a:shade val="50000"/>
+                  </a:schemeClr>
+                </a:solidFill>
+                <a:prstDash val="solid"/>
+                <a:miter lim="800000"/>
+              </a14:hiddenLine>
+            </a:ext>
+          </a:extLst>
+        </p:spPr>
+        <p:style>
+          <a:lnRef idx="2">
+            <a:schemeClr val="accent1">
+              <a:shade val="50000"/>
+            </a:schemeClr>
+          </a:lnRef>
+          <a:fillRef idx="1">
+            <a:schemeClr val="accent1"/>
+          </a:fillRef>
+          <a:effectRef idx="0">
+            <a:schemeClr val="accent1"/>
+          </a:effectRef>
+          <a:fontRef idx="minor">
+            <a:schemeClr val="lt1"/>
+          </a:fontRef>
+        </p:style>
+        <p:txBody>
+          <a:bodyPr rtlCol="0" anchor="ctr"/>
+          <a:lstStyle/>
+          <a:p>
+            <a:pPr algn="ctr"/>
+            <a:endParaRPr lang="en-US"/>
+          </a:p>
+        </p:txBody>
+      </p:sp>
+      <p:sp>
+        <p:nvSpPr>
+          <p:cNvPr id="18" name="Rectangle 12">
+            <a:extLst>
+              <a:ext uri="{FF2B5EF4-FFF2-40B4-BE49-F238E27FC236}">
+                <a16:creationId xmlns:a16="http://schemas.microsoft.com/office/drawing/2014/main" id="{1199E1B1-A8C0-4FE8-A5A8-1CB41D69F857}"/>
+              </a:ext>
+              <a:ext uri="{C183D7F6-B498-43B3-948B-1728B52AA6E4}">
+                <adec:decorative xmlns:adec="http://schemas.microsoft.com/office/drawing/2017/decorative" val="1"/>
+              </a:ext>
+            </a:extLst>
+          </p:cNvPr>
+          <p:cNvSpPr>
+            <a:spLocks noGrp="1" noRot="1" noChangeAspect="1" noMove="1" noResize="1" noEditPoints="1" noAdjustHandles="1" noChangeArrowheads="1" noChangeShapeType="1" noTextEdit="1"/>
+          </p:cNvSpPr>
+          <p:nvPr>
+            <p:extLst>
+              <p:ext uri="{386F3935-93C4-4BCD-93E2-E3B085C9AB24}">
+                <p16:designElem xmlns:p16="http://schemas.microsoft.com/office/powerpoint/2015/main" val="1"/>
+              </p:ext>
+            </p:extLst>
+          </p:nvPr>
+        </p:nvSpPr>
+        <p:spPr>
+          <a:xfrm rot="10800000" flipH="1">
+            <a:off x="2" y="0"/>
+            <a:ext cx="12191998" cy="1575955"/>
+          </a:xfrm>
+          <a:prstGeom prst="rect">
+            <a:avLst/>
+          </a:prstGeom>
+          <a:gradFill>
+            <a:gsLst>
+              <a:gs pos="0">
+                <a:srgbClr val="000000">
+                  <a:alpha val="96000"/>
+                </a:srgbClr>
+              </a:gs>
+              <a:gs pos="100000">
+                <a:schemeClr val="accent1">
+                  <a:lumMod val="75000"/>
+                </a:schemeClr>
+              </a:gs>
+            </a:gsLst>
+            <a:lin ang="6000000" scaled="0"/>
+          </a:gradFill>
+          <a:ln>
+            <a:noFill/>
+          </a:ln>
+        </p:spPr>
+        <p:style>
+          <a:lnRef idx="2">
+            <a:schemeClr val="accent1">
+              <a:shade val="50000"/>
+            </a:schemeClr>
+          </a:lnRef>
+          <a:fillRef idx="1">
+            <a:schemeClr val="accent1"/>
+          </a:fillRef>
+          <a:effectRef idx="0">
+            <a:schemeClr val="accent1"/>
+          </a:effectRef>
+          <a:fontRef idx="minor">
+            <a:schemeClr val="lt1"/>
+          </a:fontRef>
+        </p:style>
+        <p:txBody>
+          <a:bodyPr rtlCol="0" anchor="ctr"/>
+          <a:lstStyle/>
+          <a:p>
+            <a:pPr algn="ctr"/>
+            <a:endParaRPr lang="en-US"/>
+          </a:p>
+        </p:txBody>
+      </p:sp>
+      <p:sp>
+        <p:nvSpPr>
+          <p:cNvPr id="15" name="Rectangle 14">
+            <a:extLst>
+              <a:ext uri="{FF2B5EF4-FFF2-40B4-BE49-F238E27FC236}">
+                <a16:creationId xmlns:a16="http://schemas.microsoft.com/office/drawing/2014/main" id="{84A8DE83-DE75-4B41-9DB4-A7EC0B0DEC0B}"/>
+              </a:ext>
+              <a:ext uri="{C183D7F6-B498-43B3-948B-1728B52AA6E4}">
+                <adec:decorative xmlns:adec="http://schemas.microsoft.com/office/drawing/2017/decorative" val="1"/>
+              </a:ext>
+            </a:extLst>
+          </p:cNvPr>
+          <p:cNvSpPr>
+            <a:spLocks noGrp="1" noRot="1" noChangeAspect="1" noMove="1" noResize="1" noEditPoints="1" noAdjustHandles="1" noChangeArrowheads="1" noChangeShapeType="1" noTextEdit="1"/>
+          </p:cNvSpPr>
+          <p:nvPr>
+            <p:extLst>
+              <p:ext uri="{386F3935-93C4-4BCD-93E2-E3B085C9AB24}">
+                <p16:designElem xmlns:p16="http://schemas.microsoft.com/office/powerpoint/2015/main" val="1"/>
+              </p:ext>
+            </p:extLst>
+          </p:nvPr>
+        </p:nvSpPr>
+        <p:spPr>
+          <a:xfrm>
+            <a:off x="0" y="0"/>
+            <a:ext cx="8128856" cy="1575461"/>
+          </a:xfrm>
+          <a:prstGeom prst="rect">
+            <a:avLst/>
+          </a:prstGeom>
+          <a:gradFill>
+            <a:gsLst>
+              <a:gs pos="0">
+                <a:schemeClr val="accent1">
+                  <a:alpha val="41000"/>
+                </a:schemeClr>
+              </a:gs>
+              <a:gs pos="74000">
+                <a:schemeClr val="accent1">
+                  <a:lumMod val="60000"/>
+                  <a:lumOff val="40000"/>
+                  <a:alpha val="0"/>
+                </a:schemeClr>
+              </a:gs>
+            </a:gsLst>
+            <a:lin ang="8400000" scaled="0"/>
+          </a:gradFill>
+          <a:ln>
+            <a:noFill/>
+          </a:ln>
+        </p:spPr>
+        <p:style>
+          <a:lnRef idx="2">
+            <a:schemeClr val="accent1">
+              <a:shade val="50000"/>
+            </a:schemeClr>
+          </a:lnRef>
+          <a:fillRef idx="1">
+            <a:schemeClr val="accent1"/>
+          </a:fillRef>
+          <a:effectRef idx="0">
+            <a:schemeClr val="accent1"/>
+          </a:effectRef>
+          <a:fontRef idx="minor">
+            <a:schemeClr val="lt1"/>
+          </a:fontRef>
+        </p:style>
+        <p:txBody>
+          <a:bodyPr rtlCol="0" anchor="ctr"/>
+          <a:lstStyle/>
+          <a:p>
+            <a:pPr algn="ctr"/>
+            <a:endParaRPr lang="en-US"/>
+          </a:p>
+        </p:txBody>
+      </p:sp>
+      <p:sp>
+        <p:nvSpPr>
+          <p:cNvPr id="17" name="Rectangle 16">
+            <a:extLst>
+              <a:ext uri="{FF2B5EF4-FFF2-40B4-BE49-F238E27FC236}">
+                <a16:creationId xmlns:a16="http://schemas.microsoft.com/office/drawing/2014/main" id="{A7009A0A-BEF5-4EAC-AF15-E4F9F002E239}"/>
+              </a:ext>
+              <a:ext uri="{C183D7F6-B498-43B3-948B-1728B52AA6E4}">
+                <adec:decorative xmlns:adec="http://schemas.microsoft.com/office/drawing/2017/decorative" val="1"/>
+              </a:ext>
+            </a:extLst>
+          </p:cNvPr>
+          <p:cNvSpPr>
+            <a:spLocks noGrp="1" noRot="1" noChangeAspect="1" noMove="1" noResize="1" noEditPoints="1" noAdjustHandles="1" noChangeArrowheads="1" noChangeShapeType="1" noTextEdit="1"/>
+          </p:cNvSpPr>
+          <p:nvPr>
+            <p:extLst>
+              <p:ext uri="{386F3935-93C4-4BCD-93E2-E3B085C9AB24}">
+                <p16:designElem xmlns:p16="http://schemas.microsoft.com/office/powerpoint/2015/main" val="1"/>
+              </p:ext>
+            </p:extLst>
+          </p:nvPr>
+        </p:nvSpPr>
+        <p:spPr>
+          <a:xfrm flipH="1">
+            <a:off x="-3" y="-1"/>
+            <a:ext cx="12192002" cy="1574311"/>
+          </a:xfrm>
+          <a:prstGeom prst="rect">
+            <a:avLst/>
+          </a:prstGeom>
+          <a:gradFill>
+            <a:gsLst>
+              <a:gs pos="0">
+                <a:srgbClr val="000000">
+                  <a:alpha val="63000"/>
+                </a:srgbClr>
+              </a:gs>
+              <a:gs pos="78000">
+                <a:schemeClr val="accent1">
+                  <a:alpha val="15000"/>
+                </a:schemeClr>
+              </a:gs>
+            </a:gsLst>
+            <a:lin ang="15600000" scaled="0"/>
+          </a:gradFill>
+          <a:ln>
+            <a:noFill/>
+          </a:ln>
+        </p:spPr>
+        <p:style>
+          <a:lnRef idx="2">
+            <a:schemeClr val="accent1">
+              <a:shade val="50000"/>
+            </a:schemeClr>
+          </a:lnRef>
+          <a:fillRef idx="1">
+            <a:schemeClr val="accent1"/>
+          </a:fillRef>
+          <a:effectRef idx="0">
+            <a:schemeClr val="accent1"/>
+          </a:effectRef>
+          <a:fontRef idx="minor">
+            <a:schemeClr val="lt1"/>
+          </a:fontRef>
+        </p:style>
+        <p:txBody>
+          <a:bodyPr rtlCol="0" anchor="ctr"/>
+          <a:lstStyle/>
+          <a:p>
+            <a:pPr algn="ctr"/>
+            <a:endParaRPr lang="en-US"/>
+          </a:p>
+        </p:txBody>
+      </p:sp>
+      <p:sp>
+        <p:nvSpPr>
           <p:cNvPr id="6" name="CasellaDiTesto 5">
             <a:extLst>
               <a:ext uri="{FF2B5EF4-FFF2-40B4-BE49-F238E27FC236}">
@@ -4724,7 +5294,7 @@
                   </a:outerShdw>
                 </a:effectLst>
               </a:rPr>
-              <a:t>2</a:t>
+              <a:t>3</a:t>
             </a:fld>
             <a:endParaRPr lang="it-IT" sz="1600" dirty="0">
               <a:ln w="0"/>

</xml_diff>